<commit_message>
:memo: [skip actions] update admin instruction
</commit_message>
<xml_diff>
--- a/instruction/admin/img/database.pptx
+++ b/instruction/admin/img/database.pptx
@@ -104,6 +104,11 @@
       </a:defRPr>
     </a:lvl9pPr>
   </p:defaultTextStyle>
+  <p:extLst>
+    <p:ext uri="{EFAFB233-063F-42B5-8137-9DF3F51BA10A}">
+      <p15:sldGuideLst xmlns:p15="http://schemas.microsoft.com/office/powerpoint/2012/main"/>
+    </p:ext>
+  </p:extLst>
 </p:presentation>
 </file>
 
@@ -238,7 +243,7 @@
           <a:p>
             <a:fld id="{69DC42BB-D8BE-4BFC-9C7F-EFC6DF5642AA}" type="datetimeFigureOut">
               <a:rPr lang="zh-CN" altLang="en-US" smtClean="0"/>
-              <a:t>2022/3/5</a:t>
+              <a:t>2022/3/8</a:t>
             </a:fld>
             <a:endParaRPr lang="zh-CN" altLang="en-US"/>
           </a:p>
@@ -408,7 +413,7 @@
           <a:p>
             <a:fld id="{69DC42BB-D8BE-4BFC-9C7F-EFC6DF5642AA}" type="datetimeFigureOut">
               <a:rPr lang="zh-CN" altLang="en-US" smtClean="0"/>
-              <a:t>2022/3/5</a:t>
+              <a:t>2022/3/8</a:t>
             </a:fld>
             <a:endParaRPr lang="zh-CN" altLang="en-US"/>
           </a:p>
@@ -588,7 +593,7 @@
           <a:p>
             <a:fld id="{69DC42BB-D8BE-4BFC-9C7F-EFC6DF5642AA}" type="datetimeFigureOut">
               <a:rPr lang="zh-CN" altLang="en-US" smtClean="0"/>
-              <a:t>2022/3/5</a:t>
+              <a:t>2022/3/8</a:t>
             </a:fld>
             <a:endParaRPr lang="zh-CN" altLang="en-US"/>
           </a:p>
@@ -758,7 +763,7 @@
           <a:p>
             <a:fld id="{69DC42BB-D8BE-4BFC-9C7F-EFC6DF5642AA}" type="datetimeFigureOut">
               <a:rPr lang="zh-CN" altLang="en-US" smtClean="0"/>
-              <a:t>2022/3/5</a:t>
+              <a:t>2022/3/8</a:t>
             </a:fld>
             <a:endParaRPr lang="zh-CN" altLang="en-US"/>
           </a:p>
@@ -1004,7 +1009,7 @@
           <a:p>
             <a:fld id="{69DC42BB-D8BE-4BFC-9C7F-EFC6DF5642AA}" type="datetimeFigureOut">
               <a:rPr lang="zh-CN" altLang="en-US" smtClean="0"/>
-              <a:t>2022/3/5</a:t>
+              <a:t>2022/3/8</a:t>
             </a:fld>
             <a:endParaRPr lang="zh-CN" altLang="en-US"/>
           </a:p>
@@ -1236,7 +1241,7 @@
           <a:p>
             <a:fld id="{69DC42BB-D8BE-4BFC-9C7F-EFC6DF5642AA}" type="datetimeFigureOut">
               <a:rPr lang="zh-CN" altLang="en-US" smtClean="0"/>
-              <a:t>2022/3/5</a:t>
+              <a:t>2022/3/8</a:t>
             </a:fld>
             <a:endParaRPr lang="zh-CN" altLang="en-US"/>
           </a:p>
@@ -1603,7 +1608,7 @@
           <a:p>
             <a:fld id="{69DC42BB-D8BE-4BFC-9C7F-EFC6DF5642AA}" type="datetimeFigureOut">
               <a:rPr lang="zh-CN" altLang="en-US" smtClean="0"/>
-              <a:t>2022/3/5</a:t>
+              <a:t>2022/3/8</a:t>
             </a:fld>
             <a:endParaRPr lang="zh-CN" altLang="en-US"/>
           </a:p>
@@ -1721,7 +1726,7 @@
           <a:p>
             <a:fld id="{69DC42BB-D8BE-4BFC-9C7F-EFC6DF5642AA}" type="datetimeFigureOut">
               <a:rPr lang="zh-CN" altLang="en-US" smtClean="0"/>
-              <a:t>2022/3/5</a:t>
+              <a:t>2022/3/8</a:t>
             </a:fld>
             <a:endParaRPr lang="zh-CN" altLang="en-US"/>
           </a:p>
@@ -1816,7 +1821,7 @@
           <a:p>
             <a:fld id="{69DC42BB-D8BE-4BFC-9C7F-EFC6DF5642AA}" type="datetimeFigureOut">
               <a:rPr lang="zh-CN" altLang="en-US" smtClean="0"/>
-              <a:t>2022/3/5</a:t>
+              <a:t>2022/3/8</a:t>
             </a:fld>
             <a:endParaRPr lang="zh-CN" altLang="en-US"/>
           </a:p>
@@ -2093,7 +2098,7 @@
           <a:p>
             <a:fld id="{69DC42BB-D8BE-4BFC-9C7F-EFC6DF5642AA}" type="datetimeFigureOut">
               <a:rPr lang="zh-CN" altLang="en-US" smtClean="0"/>
-              <a:t>2022/3/5</a:t>
+              <a:t>2022/3/8</a:t>
             </a:fld>
             <a:endParaRPr lang="zh-CN" altLang="en-US"/>
           </a:p>
@@ -2350,7 +2355,7 @@
           <a:p>
             <a:fld id="{69DC42BB-D8BE-4BFC-9C7F-EFC6DF5642AA}" type="datetimeFigureOut">
               <a:rPr lang="zh-CN" altLang="en-US" smtClean="0"/>
-              <a:t>2022/3/5</a:t>
+              <a:t>2022/3/8</a:t>
             </a:fld>
             <a:endParaRPr lang="zh-CN" altLang="en-US"/>
           </a:p>
@@ -2563,7 +2568,7 @@
           <a:p>
             <a:fld id="{69DC42BB-D8BE-4BFC-9C7F-EFC6DF5642AA}" type="datetimeFigureOut">
               <a:rPr lang="zh-CN" altLang="en-US" smtClean="0"/>
-              <a:t>2022/3/5</a:t>
+              <a:t>2022/3/8</a:t>
             </a:fld>
             <a:endParaRPr lang="zh-CN" altLang="en-US"/>
           </a:p>
@@ -2982,7 +2987,7 @@
         </p:nvSpPr>
         <p:spPr>
           <a:xfrm>
-            <a:off x="2678377" y="1125826"/>
+            <a:off x="3838006" y="1065821"/>
             <a:ext cx="1350000" cy="628072"/>
           </a:xfrm>
           <a:prstGeom prst="roundRect">
@@ -3042,7 +3047,7 @@
         </p:nvSpPr>
         <p:spPr>
           <a:xfrm>
-            <a:off x="241127" y="1125826"/>
+            <a:off x="1400756" y="1065821"/>
             <a:ext cx="1350000" cy="628072"/>
           </a:xfrm>
           <a:prstGeom prst="roundRect">
@@ -3090,10 +3095,10 @@
       </p:sp>
       <p:sp>
         <p:nvSpPr>
-          <p:cNvPr id="6" name="矩形: 圆角 5">
+          <p:cNvPr id="8" name="矩形: 圆角 7">
             <a:extLst>
               <a:ext uri="{FF2B5EF4-FFF2-40B4-BE49-F238E27FC236}">
-                <a16:creationId xmlns:a16="http://schemas.microsoft.com/office/drawing/2014/main" id="{2941A3D5-AE08-45F1-8F3B-F880448E927F}"/>
+                <a16:creationId xmlns:a16="http://schemas.microsoft.com/office/drawing/2014/main" id="{6F5FE268-9261-4C90-BAE3-742E3824E66A}"/>
               </a:ext>
             </a:extLst>
           </p:cNvPr>
@@ -3102,7 +3107,7 @@
         </p:nvSpPr>
         <p:spPr>
           <a:xfrm>
-            <a:off x="7552875" y="1125826"/>
+            <a:off x="6275255" y="1065821"/>
             <a:ext cx="1350000" cy="628072"/>
           </a:xfrm>
           <a:prstGeom prst="roundRect">
@@ -3138,67 +3143,7 @@
                   <a:schemeClr val="tx1"/>
                 </a:solidFill>
               </a:rPr>
-              <a:t>Audit</a:t>
-            </a:r>
-            <a:endParaRPr lang="zh-CN" altLang="en-US" dirty="0">
-              <a:solidFill>
-                <a:schemeClr val="tx1"/>
-              </a:solidFill>
-            </a:endParaRPr>
-          </a:p>
-        </p:txBody>
-      </p:sp>
-      <p:sp>
-        <p:nvSpPr>
-          <p:cNvPr id="8" name="矩形: 圆角 7">
-            <a:extLst>
-              <a:ext uri="{FF2B5EF4-FFF2-40B4-BE49-F238E27FC236}">
-                <a16:creationId xmlns:a16="http://schemas.microsoft.com/office/drawing/2014/main" id="{6F5FE268-9261-4C90-BAE3-742E3824E66A}"/>
-              </a:ext>
-            </a:extLst>
-          </p:cNvPr>
-          <p:cNvSpPr/>
-          <p:nvPr/>
-        </p:nvSpPr>
-        <p:spPr>
-          <a:xfrm>
-            <a:off x="5115626" y="1125826"/>
-            <a:ext cx="1350000" cy="628072"/>
-          </a:xfrm>
-          <a:prstGeom prst="roundRect">
-            <a:avLst/>
-          </a:prstGeom>
-          <a:noFill/>
-          <a:ln w="28575"/>
-        </p:spPr>
-        <p:style>
-          <a:lnRef idx="2">
-            <a:schemeClr val="accent1">
-              <a:shade val="50000"/>
-            </a:schemeClr>
-          </a:lnRef>
-          <a:fillRef idx="1">
-            <a:schemeClr val="accent1"/>
-          </a:fillRef>
-          <a:effectRef idx="0">
-            <a:schemeClr val="accent1"/>
-          </a:effectRef>
-          <a:fontRef idx="minor">
-            <a:schemeClr val="lt1"/>
-          </a:fontRef>
-        </p:style>
-        <p:txBody>
-          <a:bodyPr rtlCol="0" anchor="ctr"/>
-          <a:lstStyle/>
-          <a:p>
-            <a:pPr algn="ctr"/>
-            <a:r>
-              <a:rPr lang="en-US" altLang="zh-CN" dirty="0">
-                <a:solidFill>
-                  <a:schemeClr val="tx1"/>
-                </a:solidFill>
-              </a:rPr>
-              <a:t>Submission</a:t>
+              <a:t>Assignment</a:t>
             </a:r>
             <a:endParaRPr lang="zh-CN" altLang="en-US" dirty="0">
               <a:solidFill>
@@ -3219,15 +3164,13 @@
           </p:cNvPr>
           <p:cNvCxnSpPr>
             <a:cxnSpLocks/>
-            <a:stCxn id="5" idx="3"/>
-            <a:endCxn id="4" idx="1"/>
           </p:cNvCxnSpPr>
           <p:nvPr/>
         </p:nvCxnSpPr>
         <p:spPr>
           <a:xfrm>
-            <a:off x="1591130" y="1439862"/>
-            <a:ext cx="1087249" cy="0"/>
+            <a:off x="2750756" y="1379857"/>
+            <a:ext cx="1087250" cy="0"/>
           </a:xfrm>
           <a:prstGeom prst="line">
             <a:avLst/>
@@ -3260,14 +3203,12 @@
           </p:cNvPr>
           <p:cNvCxnSpPr>
             <a:cxnSpLocks/>
-            <a:stCxn id="4" idx="3"/>
-            <a:endCxn id="8" idx="1"/>
           </p:cNvCxnSpPr>
           <p:nvPr/>
         </p:nvCxnSpPr>
         <p:spPr>
           <a:xfrm>
-            <a:off x="4028377" y="1439862"/>
+            <a:off x="5188006" y="1379857"/>
             <a:ext cx="1087249" cy="0"/>
           </a:xfrm>
           <a:prstGeom prst="line">
@@ -3290,47 +3231,6 @@
           </a:fontRef>
         </p:style>
       </p:cxnSp>
-      <p:cxnSp>
-        <p:nvCxnSpPr>
-          <p:cNvPr id="14" name="直接连接符 13">
-            <a:extLst>
-              <a:ext uri="{FF2B5EF4-FFF2-40B4-BE49-F238E27FC236}">
-                <a16:creationId xmlns:a16="http://schemas.microsoft.com/office/drawing/2014/main" id="{119C6F88-5515-4398-B89F-284C184947D8}"/>
-              </a:ext>
-            </a:extLst>
-          </p:cNvPr>
-          <p:cNvCxnSpPr>
-            <a:cxnSpLocks/>
-            <a:stCxn id="8" idx="3"/>
-            <a:endCxn id="6" idx="1"/>
-          </p:cNvCxnSpPr>
-          <p:nvPr/>
-        </p:nvCxnSpPr>
-        <p:spPr>
-          <a:xfrm>
-            <a:off x="6465627" y="1439862"/>
-            <a:ext cx="1087247" cy="0"/>
-          </a:xfrm>
-          <a:prstGeom prst="line">
-            <a:avLst/>
-          </a:prstGeom>
-          <a:ln w="28575"/>
-        </p:spPr>
-        <p:style>
-          <a:lnRef idx="1">
-            <a:schemeClr val="accent1"/>
-          </a:lnRef>
-          <a:fillRef idx="0">
-            <a:schemeClr val="accent1"/>
-          </a:fillRef>
-          <a:effectRef idx="0">
-            <a:schemeClr val="accent1"/>
-          </a:effectRef>
-          <a:fontRef idx="minor">
-            <a:schemeClr val="tx1"/>
-          </a:fontRef>
-        </p:style>
-      </p:cxnSp>
       <p:sp>
         <p:nvSpPr>
           <p:cNvPr id="23" name="文本框 22">
@@ -3345,7 +3245,7 @@
         </p:nvSpPr>
         <p:spPr>
           <a:xfrm>
-            <a:off x="1662544" y="1005816"/>
+            <a:off x="2822173" y="976917"/>
             <a:ext cx="301686" cy="369332"/>
           </a:xfrm>
           <a:prstGeom prst="rect">
@@ -3381,7 +3281,7 @@
         </p:nvSpPr>
         <p:spPr>
           <a:xfrm>
-            <a:off x="2305271" y="1005816"/>
+            <a:off x="3464900" y="976917"/>
             <a:ext cx="306494" cy="369332"/>
           </a:xfrm>
           <a:prstGeom prst="rect">
@@ -3417,7 +3317,7 @@
         </p:nvSpPr>
         <p:spPr>
           <a:xfrm>
-            <a:off x="4094986" y="1005816"/>
+            <a:off x="5254615" y="976917"/>
             <a:ext cx="301686" cy="369332"/>
           </a:xfrm>
           <a:prstGeom prst="rect">
@@ -3453,7 +3353,7 @@
         </p:nvSpPr>
         <p:spPr>
           <a:xfrm>
-            <a:off x="4737712" y="1005816"/>
+            <a:off x="5897341" y="976917"/>
             <a:ext cx="306494" cy="369332"/>
           </a:xfrm>
           <a:prstGeom prst="rect">
@@ -3470,78 +3370,6 @@
             <a:r>
               <a:rPr lang="en-US" altLang="zh-CN" dirty="0"/>
               <a:t>n</a:t>
-            </a:r>
-            <a:endParaRPr lang="zh-CN" altLang="en-US" dirty="0"/>
-          </a:p>
-        </p:txBody>
-      </p:sp>
-      <p:sp>
-        <p:nvSpPr>
-          <p:cNvPr id="27" name="文本框 26">
-            <a:extLst>
-              <a:ext uri="{FF2B5EF4-FFF2-40B4-BE49-F238E27FC236}">
-                <a16:creationId xmlns:a16="http://schemas.microsoft.com/office/drawing/2014/main" id="{EEC04DCB-88CA-49E9-89C4-C10AD6934E8A}"/>
-              </a:ext>
-            </a:extLst>
-          </p:cNvPr>
-          <p:cNvSpPr txBox="1"/>
-          <p:nvPr/>
-        </p:nvSpPr>
-        <p:spPr>
-          <a:xfrm>
-            <a:off x="6532235" y="1005816"/>
-            <a:ext cx="301686" cy="369332"/>
-          </a:xfrm>
-          <a:prstGeom prst="rect">
-            <a:avLst/>
-          </a:prstGeom>
-          <a:noFill/>
-        </p:spPr>
-        <p:txBody>
-          <a:bodyPr wrap="none" rtlCol="0">
-            <a:spAutoFit/>
-          </a:bodyPr>
-          <a:lstStyle/>
-          <a:p>
-            <a:r>
-              <a:rPr lang="en-US" altLang="zh-CN" dirty="0"/>
-              <a:t>1</a:t>
-            </a:r>
-            <a:endParaRPr lang="zh-CN" altLang="en-US" dirty="0"/>
-          </a:p>
-        </p:txBody>
-      </p:sp>
-      <p:sp>
-        <p:nvSpPr>
-          <p:cNvPr id="28" name="文本框 27">
-            <a:extLst>
-              <a:ext uri="{FF2B5EF4-FFF2-40B4-BE49-F238E27FC236}">
-                <a16:creationId xmlns:a16="http://schemas.microsoft.com/office/drawing/2014/main" id="{60771D63-CEA2-4DBE-BAAF-ED6D880939F7}"/>
-              </a:ext>
-            </a:extLst>
-          </p:cNvPr>
-          <p:cNvSpPr txBox="1"/>
-          <p:nvPr/>
-        </p:nvSpPr>
-        <p:spPr>
-          <a:xfrm>
-            <a:off x="7174960" y="1005816"/>
-            <a:ext cx="301686" cy="369332"/>
-          </a:xfrm>
-          <a:prstGeom prst="rect">
-            <a:avLst/>
-          </a:prstGeom>
-          <a:noFill/>
-        </p:spPr>
-        <p:txBody>
-          <a:bodyPr wrap="none" rtlCol="0">
-            <a:spAutoFit/>
-          </a:bodyPr>
-          <a:lstStyle/>
-          <a:p>
-            <a:r>
-              <a:rPr lang="en-US" altLang="zh-CN" dirty="0"/>
-              <a:t>1</a:t>
             </a:r>
             <a:endParaRPr lang="zh-CN" altLang="en-US" dirty="0"/>
           </a:p>

</xml_diff>